<commit_message>
monthly trips + powerpoint
</commit_message>
<xml_diff>
--- a/ecoSafe.pptx
+++ b/ecoSafe.pptx
@@ -11,6 +11,7 @@
     <p:sldId id="261" r:id="rId5"/>
     <p:sldId id="259" r:id="rId6"/>
     <p:sldId id="260" r:id="rId7"/>
+    <p:sldId id="262" r:id="rId8"/>
   </p:sldIdLst>
   <p:sldSz cx="12192000" cy="6858000"/>
   <p:notesSz cx="6858000" cy="9144000"/>
@@ -109,6 +110,11 @@
       </a:defRPr>
     </a:lvl9pPr>
   </p:defaultTextStyle>
+  <p:extLst>
+    <p:ext uri="{EFAFB233-063F-42B5-8137-9DF3F51BA10A}">
+      <p15:sldGuideLst xmlns:p15="http://schemas.microsoft.com/office/powerpoint/2012/main"/>
+    </p:ext>
+  </p:extLst>
 </p:presentation>
 </file>
 
@@ -12186,6 +12192,543 @@
 </p:sld>
 </file>
 
+<file path=ppt/slides/slide7.xml><?xml version="1.0" encoding="utf-8"?>
+<p:sld xmlns:a="http://schemas.openxmlformats.org/drawingml/2006/main" xmlns:r="http://schemas.openxmlformats.org/officeDocument/2006/relationships" xmlns:p="http://schemas.openxmlformats.org/presentationml/2006/main">
+  <p:cSld>
+    <p:bg>
+      <p:bgPr>
+        <a:solidFill>
+          <a:schemeClr val="bg1"/>
+        </a:solidFill>
+        <a:effectLst/>
+      </p:bgPr>
+    </p:bg>
+    <p:spTree>
+      <p:nvGrpSpPr>
+        <p:cNvPr id="1" name=""/>
+        <p:cNvGrpSpPr/>
+        <p:nvPr/>
+      </p:nvGrpSpPr>
+      <p:grpSpPr>
+        <a:xfrm>
+          <a:off x="0" y="0"/>
+          <a:ext cx="0" cy="0"/>
+          <a:chOff x="0" y="0"/>
+          <a:chExt cx="0" cy="0"/>
+        </a:xfrm>
+      </p:grpSpPr>
+      <p:sp>
+        <p:nvSpPr>
+          <p:cNvPr id="20" name="Freeform: Shape 9">
+            <a:extLst>
+              <a:ext uri="{FF2B5EF4-FFF2-40B4-BE49-F238E27FC236}">
+                <a16:creationId xmlns:a16="http://schemas.microsoft.com/office/drawing/2014/main" id="{774A975B-A886-5202-0489-6965514A0D14}"/>
+              </a:ext>
+              <a:ext uri="{C183D7F6-B498-43B3-948B-1728B52AA6E4}">
+                <adec:decorative xmlns:adec="http://schemas.microsoft.com/office/drawing/2017/decorative" val="1"/>
+              </a:ext>
+            </a:extLst>
+          </p:cNvPr>
+          <p:cNvSpPr>
+            <a:spLocks noGrp="1" noRot="1" noChangeAspect="1" noMove="1" noResize="1" noEditPoints="1" noAdjustHandles="1" noChangeArrowheads="1" noChangeShapeType="1" noTextEdit="1"/>
+          </p:cNvSpPr>
+          <p:nvPr>
+            <p:extLst>
+              <p:ext uri="{386F3935-93C4-4BCD-93E2-E3B085C9AB24}">
+                <p16:designElem xmlns:p16="http://schemas.microsoft.com/office/powerpoint/2015/main" val="1"/>
+              </p:ext>
+            </p:extLst>
+          </p:nvPr>
+        </p:nvSpPr>
+        <p:spPr>
+          <a:xfrm>
+            <a:off x="517869" y="508090"/>
+            <a:ext cx="11153214" cy="149279"/>
+          </a:xfrm>
+          <a:custGeom>
+            <a:avLst/>
+            <a:gdLst>
+              <a:gd name="connsiteX0" fmla="*/ 0 w 8085002"/>
+              <a:gd name="connsiteY0" fmla="*/ 0 h 149279"/>
+              <a:gd name="connsiteX1" fmla="*/ 8085002 w 8085002"/>
+              <a:gd name="connsiteY1" fmla="*/ 0 h 149279"/>
+              <a:gd name="connsiteX2" fmla="*/ 8085002 w 8085002"/>
+              <a:gd name="connsiteY2" fmla="*/ 149279 h 149279"/>
+              <a:gd name="connsiteX3" fmla="*/ 0 w 8085002"/>
+              <a:gd name="connsiteY3" fmla="*/ 149279 h 149279"/>
+            </a:gdLst>
+            <a:ahLst/>
+            <a:cxnLst>
+              <a:cxn ang="0">
+                <a:pos x="connsiteX0" y="connsiteY0"/>
+              </a:cxn>
+              <a:cxn ang="0">
+                <a:pos x="connsiteX1" y="connsiteY1"/>
+              </a:cxn>
+              <a:cxn ang="0">
+                <a:pos x="connsiteX2" y="connsiteY2"/>
+              </a:cxn>
+              <a:cxn ang="0">
+                <a:pos x="connsiteX3" y="connsiteY3"/>
+              </a:cxn>
+            </a:cxnLst>
+            <a:rect l="l" t="t" r="r" b="b"/>
+            <a:pathLst>
+              <a:path w="8085002" h="149279">
+                <a:moveTo>
+                  <a:pt x="0" y="0"/>
+                </a:moveTo>
+                <a:lnTo>
+                  <a:pt x="8085002" y="0"/>
+                </a:lnTo>
+                <a:lnTo>
+                  <a:pt x="8085002" y="149279"/>
+                </a:lnTo>
+                <a:lnTo>
+                  <a:pt x="0" y="149279"/>
+                </a:lnTo>
+                <a:close/>
+              </a:path>
+            </a:pathLst>
+          </a:custGeom>
+          <a:solidFill>
+            <a:schemeClr val="tx1"/>
+          </a:solidFill>
+          <a:ln>
+            <a:noFill/>
+          </a:ln>
+        </p:spPr>
+        <p:style>
+          <a:lnRef idx="2">
+            <a:schemeClr val="accent1">
+              <a:shade val="50000"/>
+            </a:schemeClr>
+          </a:lnRef>
+          <a:fillRef idx="1">
+            <a:schemeClr val="accent1"/>
+          </a:fillRef>
+          <a:effectRef idx="0">
+            <a:schemeClr val="accent1"/>
+          </a:effectRef>
+          <a:fontRef idx="minor">
+            <a:schemeClr val="lt1"/>
+          </a:fontRef>
+        </p:style>
+        <p:txBody>
+          <a:bodyPr wrap="square" rtlCol="0" anchor="ctr">
+            <a:noAutofit/>
+          </a:bodyPr>
+          <a:lstStyle/>
+          <a:p>
+            <a:pPr algn="ctr"/>
+            <a:endParaRPr lang="en-US"/>
+          </a:p>
+        </p:txBody>
+      </p:sp>
+      <p:sp>
+        <p:nvSpPr>
+          <p:cNvPr id="21" name="Freeform: Shape 11">
+            <a:extLst>
+              <a:ext uri="{FF2B5EF4-FFF2-40B4-BE49-F238E27FC236}">
+                <a16:creationId xmlns:a16="http://schemas.microsoft.com/office/drawing/2014/main" id="{EA67E988-5919-57BB-C7DE-D3EAD38A3045}"/>
+              </a:ext>
+              <a:ext uri="{C183D7F6-B498-43B3-948B-1728B52AA6E4}">
+                <adec:decorative xmlns:adec="http://schemas.microsoft.com/office/drawing/2017/decorative" val="1"/>
+              </a:ext>
+            </a:extLst>
+          </p:cNvPr>
+          <p:cNvSpPr>
+            <a:spLocks noGrp="1" noRot="1" noChangeAspect="1" noMove="1" noResize="1" noEditPoints="1" noAdjustHandles="1" noChangeArrowheads="1" noChangeShapeType="1" noTextEdit="1"/>
+          </p:cNvSpPr>
+          <p:nvPr>
+            <p:extLst>
+              <p:ext uri="{386F3935-93C4-4BCD-93E2-E3B085C9AB24}">
+                <p16:designElem xmlns:p16="http://schemas.microsoft.com/office/powerpoint/2015/main" val="1"/>
+              </p:ext>
+            </p:extLst>
+          </p:nvPr>
+        </p:nvSpPr>
+        <p:spPr>
+          <a:xfrm>
+            <a:off x="517870" y="6209925"/>
+            <a:ext cx="11155680" cy="45719"/>
+          </a:xfrm>
+          <a:custGeom>
+            <a:avLst/>
+            <a:gdLst/>
+            <a:ahLst/>
+            <a:cxnLst/>
+            <a:rect l="l" t="t" r="r" b="b"/>
+            <a:pathLst>
+              <a:path w="8715708" h="45719">
+                <a:moveTo>
+                  <a:pt x="0" y="0"/>
+                </a:moveTo>
+                <a:lnTo>
+                  <a:pt x="3694525" y="0"/>
+                </a:lnTo>
+                <a:lnTo>
+                  <a:pt x="5021183" y="0"/>
+                </a:lnTo>
+                <a:lnTo>
+                  <a:pt x="8715708" y="0"/>
+                </a:lnTo>
+                <a:lnTo>
+                  <a:pt x="8715708" y="45719"/>
+                </a:lnTo>
+                <a:lnTo>
+                  <a:pt x="5021183" y="45719"/>
+                </a:lnTo>
+                <a:lnTo>
+                  <a:pt x="3694525" y="45719"/>
+                </a:lnTo>
+                <a:lnTo>
+                  <a:pt x="0" y="45719"/>
+                </a:lnTo>
+                <a:close/>
+              </a:path>
+            </a:pathLst>
+          </a:custGeom>
+          <a:solidFill>
+            <a:schemeClr val="tx1"/>
+          </a:solidFill>
+          <a:ln>
+            <a:noFill/>
+          </a:ln>
+        </p:spPr>
+        <p:style>
+          <a:lnRef idx="2">
+            <a:schemeClr val="accent1">
+              <a:shade val="50000"/>
+            </a:schemeClr>
+          </a:lnRef>
+          <a:fillRef idx="1">
+            <a:schemeClr val="accent1"/>
+          </a:fillRef>
+          <a:effectRef idx="0">
+            <a:schemeClr val="accent1"/>
+          </a:effectRef>
+          <a:fontRef idx="minor">
+            <a:schemeClr val="lt1"/>
+          </a:fontRef>
+        </p:style>
+        <p:txBody>
+          <a:bodyPr wrap="square" rtlCol="0" anchor="ctr">
+            <a:noAutofit/>
+          </a:bodyPr>
+          <a:lstStyle/>
+          <a:p>
+            <a:pPr algn="ctr"/>
+            <a:endParaRPr lang="en-US"/>
+          </a:p>
+        </p:txBody>
+      </p:sp>
+      <p:sp useBgFill="1">
+        <p:nvSpPr>
+          <p:cNvPr id="22" name="Rectangle 21">
+            <a:extLst>
+              <a:ext uri="{FF2B5EF4-FFF2-40B4-BE49-F238E27FC236}">
+                <a16:creationId xmlns:a16="http://schemas.microsoft.com/office/drawing/2014/main" id="{FAF3766F-DEF3-4802-BB0D-7A18EDD9704F}"/>
+              </a:ext>
+              <a:ext uri="{C183D7F6-B498-43B3-948B-1728B52AA6E4}">
+                <adec:decorative xmlns:adec="http://schemas.microsoft.com/office/drawing/2017/decorative" val="1"/>
+              </a:ext>
+            </a:extLst>
+          </p:cNvPr>
+          <p:cNvSpPr>
+            <a:spLocks noGrp="1" noRot="1" noChangeAspect="1" noMove="1" noResize="1" noEditPoints="1" noAdjustHandles="1" noChangeArrowheads="1" noChangeShapeType="1" noTextEdit="1"/>
+          </p:cNvSpPr>
+          <p:nvPr>
+            <p:extLst>
+              <p:ext uri="{386F3935-93C4-4BCD-93E2-E3B085C9AB24}">
+                <p16:designElem xmlns:p16="http://schemas.microsoft.com/office/powerpoint/2015/main" val="1"/>
+              </p:ext>
+            </p:extLst>
+          </p:nvPr>
+        </p:nvSpPr>
+        <p:spPr>
+          <a:xfrm>
+            <a:off x="0" y="0"/>
+            <a:ext cx="12188952" cy="6857995"/>
+          </a:xfrm>
+          <a:prstGeom prst="rect">
+            <a:avLst/>
+          </a:prstGeom>
+          <a:ln>
+            <a:noFill/>
+          </a:ln>
+        </p:spPr>
+        <p:style>
+          <a:lnRef idx="2">
+            <a:schemeClr val="accent1">
+              <a:shade val="50000"/>
+            </a:schemeClr>
+          </a:lnRef>
+          <a:fillRef idx="1">
+            <a:schemeClr val="accent1"/>
+          </a:fillRef>
+          <a:effectRef idx="0">
+            <a:schemeClr val="accent1"/>
+          </a:effectRef>
+          <a:fontRef idx="minor">
+            <a:schemeClr val="lt1"/>
+          </a:fontRef>
+        </p:style>
+        <p:txBody>
+          <a:bodyPr rtlCol="0" anchor="ctr"/>
+          <a:lstStyle/>
+          <a:p>
+            <a:pPr algn="ctr"/>
+            <a:endParaRPr lang="en-US" dirty="0"/>
+          </a:p>
+        </p:txBody>
+      </p:sp>
+      <p:sp>
+        <p:nvSpPr>
+          <p:cNvPr id="2" name="Title 1">
+            <a:extLst>
+              <a:ext uri="{FF2B5EF4-FFF2-40B4-BE49-F238E27FC236}">
+                <a16:creationId xmlns:a16="http://schemas.microsoft.com/office/drawing/2014/main" id="{FCA4024B-2955-BFB2-2341-2485B007A2DE}"/>
+              </a:ext>
+            </a:extLst>
+          </p:cNvPr>
+          <p:cNvSpPr>
+            <a:spLocks noGrp="1"/>
+          </p:cNvSpPr>
+          <p:nvPr>
+            <p:ph type="title"/>
+          </p:nvPr>
+        </p:nvSpPr>
+        <p:spPr>
+          <a:xfrm>
+            <a:off x="517870" y="978408"/>
+            <a:ext cx="3465681" cy="2450592"/>
+          </a:xfrm>
+        </p:spPr>
+        <p:txBody>
+          <a:bodyPr vert="horz" lIns="91440" tIns="45720" rIns="91440" bIns="45720" rtlCol="0" anchor="t">
+            <a:normAutofit/>
+          </a:bodyPr>
+          <a:lstStyle/>
+          <a:p>
+            <a:r>
+              <a:rPr lang="en-US" sz="4800" dirty="0">
+                <a:solidFill>
+                  <a:schemeClr val="tx2"/>
+                </a:solidFill>
+              </a:rPr>
+              <a:t>Thanks for listening</a:t>
+            </a:r>
+          </a:p>
+        </p:txBody>
+      </p:sp>
+      <p:sp>
+        <p:nvSpPr>
+          <p:cNvPr id="23" name="Rectangle 22">
+            <a:extLst>
+              <a:ext uri="{FF2B5EF4-FFF2-40B4-BE49-F238E27FC236}">
+                <a16:creationId xmlns:a16="http://schemas.microsoft.com/office/drawing/2014/main" id="{D91952F0-771E-D2ED-C333-EEED6708B80C}"/>
+              </a:ext>
+              <a:ext uri="{C183D7F6-B498-43B3-948B-1728B52AA6E4}">
+                <adec:decorative xmlns:adec="http://schemas.microsoft.com/office/drawing/2017/decorative" val="1"/>
+              </a:ext>
+            </a:extLst>
+          </p:cNvPr>
+          <p:cNvSpPr>
+            <a:spLocks noGrp="1" noRot="1" noChangeAspect="1" noMove="1" noResize="1" noEditPoints="1" noAdjustHandles="1" noChangeArrowheads="1" noChangeShapeType="1" noTextEdit="1"/>
+          </p:cNvSpPr>
+          <p:nvPr>
+            <p:extLst>
+              <p:ext uri="{386F3935-93C4-4BCD-93E2-E3B085C9AB24}">
+                <p16:designElem xmlns:p16="http://schemas.microsoft.com/office/powerpoint/2015/main" val="1"/>
+              </p:ext>
+            </p:extLst>
+          </p:nvPr>
+        </p:nvSpPr>
+        <p:spPr>
+          <a:xfrm>
+            <a:off x="517871" y="508090"/>
+            <a:ext cx="3466424" cy="149279"/>
+          </a:xfrm>
+          <a:prstGeom prst="rect">
+            <a:avLst/>
+          </a:prstGeom>
+          <a:solidFill>
+            <a:schemeClr val="tx1"/>
+          </a:solidFill>
+          <a:ln>
+            <a:noFill/>
+          </a:ln>
+        </p:spPr>
+        <p:style>
+          <a:lnRef idx="2">
+            <a:schemeClr val="accent1">
+              <a:shade val="50000"/>
+            </a:schemeClr>
+          </a:lnRef>
+          <a:fillRef idx="1">
+            <a:schemeClr val="accent1"/>
+          </a:fillRef>
+          <a:effectRef idx="0">
+            <a:schemeClr val="accent1"/>
+          </a:effectRef>
+          <a:fontRef idx="minor">
+            <a:schemeClr val="lt1"/>
+          </a:fontRef>
+        </p:style>
+        <p:txBody>
+          <a:bodyPr rtlCol="0" anchor="ctr"/>
+          <a:lstStyle/>
+          <a:p>
+            <a:pPr algn="ctr"/>
+            <a:endParaRPr lang="en-US"/>
+          </a:p>
+        </p:txBody>
+      </p:sp>
+      <p:pic>
+        <p:nvPicPr>
+          <p:cNvPr id="24" name="Graphic 23" descr="Grinning Face with No Fill">
+            <a:extLst>
+              <a:ext uri="{FF2B5EF4-FFF2-40B4-BE49-F238E27FC236}">
+                <a16:creationId xmlns:a16="http://schemas.microsoft.com/office/drawing/2014/main" id="{971C34DB-A45A-BBF4-0C89-B3EA79925F69}"/>
+              </a:ext>
+            </a:extLst>
+          </p:cNvPr>
+          <p:cNvPicPr>
+            <a:picLocks noChangeAspect="1"/>
+          </p:cNvPicPr>
+          <p:nvPr/>
+        </p:nvPicPr>
+        <p:blipFill>
+          <a:blip r:embed="rId2">
+            <a:extLst>
+              <a:ext uri="{28A0092B-C50C-407E-A947-70E740481C1C}">
+                <a14:useLocalDpi xmlns:a14="http://schemas.microsoft.com/office/drawing/2010/main" val="0"/>
+              </a:ext>
+              <a:ext uri="{96DAC541-7B7A-43D3-8B79-37D633B846F1}">
+                <asvg:svgBlip xmlns:asvg="http://schemas.microsoft.com/office/drawing/2016/SVG/main" r:embed="rId3"/>
+              </a:ext>
+            </a:extLst>
+          </a:blip>
+          <a:stretch>
+            <a:fillRect/>
+          </a:stretch>
+        </p:blipFill>
+        <p:spPr>
+          <a:xfrm>
+            <a:off x="5130496" y="657369"/>
+            <a:ext cx="5642166" cy="5642166"/>
+          </a:xfrm>
+          <a:prstGeom prst="rect">
+            <a:avLst/>
+          </a:prstGeom>
+        </p:spPr>
+      </p:pic>
+      <p:sp>
+        <p:nvSpPr>
+          <p:cNvPr id="25" name="Rectangle 24">
+            <a:extLst>
+              <a:ext uri="{FF2B5EF4-FFF2-40B4-BE49-F238E27FC236}">
+                <a16:creationId xmlns:a16="http://schemas.microsoft.com/office/drawing/2014/main" id="{3FB6D83C-2377-9CAD-A991-9E0B6AF25067}"/>
+              </a:ext>
+              <a:ext uri="{C183D7F6-B498-43B3-948B-1728B52AA6E4}">
+                <adec:decorative xmlns:adec="http://schemas.microsoft.com/office/drawing/2017/decorative" val="1"/>
+              </a:ext>
+            </a:extLst>
+          </p:cNvPr>
+          <p:cNvSpPr>
+            <a:spLocks noGrp="1" noRot="1" noChangeAspect="1" noMove="1" noResize="1" noEditPoints="1" noAdjustHandles="1" noChangeArrowheads="1" noChangeShapeType="1" noTextEdit="1"/>
+          </p:cNvSpPr>
+          <p:nvPr>
+            <p:extLst>
+              <p:ext uri="{386F3935-93C4-4BCD-93E2-E3B085C9AB24}">
+                <p16:designElem xmlns:p16="http://schemas.microsoft.com/office/powerpoint/2015/main" val="1"/>
+              </p:ext>
+            </p:extLst>
+          </p:nvPr>
+        </p:nvSpPr>
+        <p:spPr>
+          <a:xfrm>
+            <a:off x="521208" y="6299535"/>
+            <a:ext cx="3465681" cy="46469"/>
+          </a:xfrm>
+          <a:prstGeom prst="rect">
+            <a:avLst/>
+          </a:prstGeom>
+          <a:solidFill>
+            <a:schemeClr val="tx1"/>
+          </a:solidFill>
+          <a:ln>
+            <a:noFill/>
+          </a:ln>
+        </p:spPr>
+        <p:style>
+          <a:lnRef idx="2">
+            <a:schemeClr val="accent1">
+              <a:shade val="50000"/>
+            </a:schemeClr>
+          </a:lnRef>
+          <a:fillRef idx="1">
+            <a:schemeClr val="accent1"/>
+          </a:fillRef>
+          <a:effectRef idx="0">
+            <a:schemeClr val="accent1"/>
+          </a:effectRef>
+          <a:fontRef idx="minor">
+            <a:schemeClr val="lt1"/>
+          </a:fontRef>
+        </p:style>
+        <p:txBody>
+          <a:bodyPr rtlCol="0" anchor="ctr"/>
+          <a:lstStyle/>
+          <a:p>
+            <a:pPr marL="0" marR="0" lvl="0" indent="0" algn="ctr" defTabSz="914400" rtl="0" eaLnBrk="1" fontAlgn="auto" latinLnBrk="0" hangingPunct="1">
+              <a:lnSpc>
+                <a:spcPct val="100000"/>
+              </a:lnSpc>
+              <a:spcBef>
+                <a:spcPts val="0"/>
+              </a:spcBef>
+              <a:spcAft>
+                <a:spcPts val="0"/>
+              </a:spcAft>
+              <a:buClrTx/>
+              <a:buSzTx/>
+              <a:buFontTx/>
+              <a:buNone/>
+              <a:tabLst/>
+              <a:defRPr/>
+            </a:pPr>
+            <a:endParaRPr kumimoji="0" lang="en-US" sz="1800" b="0" i="0" u="none" strike="noStrike" kern="1200" cap="none" spc="0" normalizeH="0" baseline="0" noProof="0">
+              <a:ln>
+                <a:noFill/>
+              </a:ln>
+              <a:solidFill>
+                <a:prstClr val="white"/>
+              </a:solidFill>
+              <a:effectLst/>
+              <a:uLnTx/>
+              <a:uFillTx/>
+              <a:latin typeface="Bierstadt"/>
+              <a:ea typeface="+mn-ea"/>
+              <a:cs typeface="+mn-cs"/>
+            </a:endParaRPr>
+          </a:p>
+        </p:txBody>
+      </p:sp>
+    </p:spTree>
+    <p:extLst>
+      <p:ext uri="{BB962C8B-B14F-4D97-AF65-F5344CB8AC3E}">
+        <p14:creationId xmlns:p14="http://schemas.microsoft.com/office/powerpoint/2010/main" val="731412718"/>
+      </p:ext>
+    </p:extLst>
+  </p:cSld>
+  <p:clrMapOvr>
+    <a:masterClrMapping/>
+  </p:clrMapOvr>
+</p:sld>
+</file>
+
 <file path=ppt/theme/theme1.xml><?xml version="1.0" encoding="utf-8"?>
 <a:theme xmlns:a="http://schemas.openxmlformats.org/drawingml/2006/main" name="GestaltVTI">
   <a:themeElements>

</xml_diff>